<commit_message>
presentation update, minor fixes
</commit_message>
<xml_diff>
--- a/Proekt_BotEnglishTeacher.pptx
+++ b/Proekt_BotEnglishTeacher.pptx
@@ -123,7 +123,18 @@
   </p:defaultTextStyle>
   <p:extLst>
     <p:ext uri="{EFAFB233-063F-42B5-8137-9DF3F51BA10A}">
-      <p15:sldGuideLst xmlns:p15="http://schemas.microsoft.com/office/powerpoint/2012/main" xmlns=""/>
+      <p15:sldGuideLst xmlns:p15="http://schemas.microsoft.com/office/powerpoint/2012/main">
+        <p15:guide id="1" orient="horz" pos="2160">
+          <p15:clr>
+            <a:srgbClr val="A4A3A4"/>
+          </p15:clr>
+        </p15:guide>
+        <p15:guide id="2" pos="3840">
+          <p15:clr>
+            <a:srgbClr val="A4A3A4"/>
+          </p15:clr>
+        </p15:guide>
+      </p15:sldGuideLst>
     </p:ext>
   </p:extLst>
 </p:presentation>
@@ -4409,7 +4420,7 @@
           <a:p>
             <a:fld id="{48A87A34-81AB-432B-8DAE-1953F412C126}" type="datetimeFigureOut">
               <a:rPr lang="en-US" dirty="0"/>
-              <a:t>4/18/2018</a:t>
+              <a:t>5/12/2018</a:t>
             </a:fld>
             <a:endParaRPr lang="en-US" dirty="0"/>
           </a:p>
@@ -4671,7 +4682,7 @@
           <a:p>
             <a:fld id="{48A87A34-81AB-432B-8DAE-1953F412C126}" type="datetimeFigureOut">
               <a:rPr lang="en-US" dirty="0"/>
-              <a:t>4/18/2018</a:t>
+              <a:t>5/12/2018</a:t>
             </a:fld>
             <a:endParaRPr lang="en-US" dirty="0"/>
           </a:p>
@@ -4862,7 +4873,7 @@
           <a:p>
             <a:fld id="{48A87A34-81AB-432B-8DAE-1953F412C126}" type="datetimeFigureOut">
               <a:rPr lang="en-US" dirty="0"/>
-              <a:t>4/18/2018</a:t>
+              <a:t>5/12/2018</a:t>
             </a:fld>
             <a:endParaRPr lang="en-US" dirty="0"/>
           </a:p>
@@ -5120,7 +5131,7 @@
           <a:p>
             <a:fld id="{48A87A34-81AB-432B-8DAE-1953F412C126}" type="datetimeFigureOut">
               <a:rPr lang="en-US" dirty="0"/>
-              <a:t>4/18/2018</a:t>
+              <a:t>5/12/2018</a:t>
             </a:fld>
             <a:endParaRPr lang="en-US" dirty="0"/>
           </a:p>
@@ -5549,7 +5560,7 @@
           <a:p>
             <a:fld id="{48A87A34-81AB-432B-8DAE-1953F412C126}" type="datetimeFigureOut">
               <a:rPr lang="en-US" dirty="0"/>
-              <a:t>4/18/2018</a:t>
+              <a:t>5/12/2018</a:t>
             </a:fld>
             <a:endParaRPr lang="en-US" dirty="0"/>
           </a:p>
@@ -6090,7 +6101,7 @@
           <a:p>
             <a:fld id="{48A87A34-81AB-432B-8DAE-1953F412C126}" type="datetimeFigureOut">
               <a:rPr lang="en-US" dirty="0"/>
-              <a:t>4/18/2018</a:t>
+              <a:t>5/12/2018</a:t>
             </a:fld>
             <a:endParaRPr lang="en-US" dirty="0"/>
           </a:p>
@@ -6805,7 +6816,7 @@
           <a:p>
             <a:fld id="{48A87A34-81AB-432B-8DAE-1953F412C126}" type="datetimeFigureOut">
               <a:rPr lang="en-US" dirty="0"/>
-              <a:t>4/18/2018</a:t>
+              <a:t>5/12/2018</a:t>
             </a:fld>
             <a:endParaRPr lang="en-US" dirty="0"/>
           </a:p>
@@ -6970,7 +6981,7 @@
           <a:p>
             <a:fld id="{48A87A34-81AB-432B-8DAE-1953F412C126}" type="datetimeFigureOut">
               <a:rPr lang="en-US" dirty="0"/>
-              <a:t>4/18/2018</a:t>
+              <a:t>5/12/2018</a:t>
             </a:fld>
             <a:endParaRPr lang="en-US" dirty="0"/>
           </a:p>
@@ -7145,7 +7156,7 @@
           <a:p>
             <a:fld id="{48A87A34-81AB-432B-8DAE-1953F412C126}" type="datetimeFigureOut">
               <a:rPr lang="en-US" dirty="0"/>
-              <a:t>4/18/2018</a:t>
+              <a:t>5/12/2018</a:t>
             </a:fld>
             <a:endParaRPr lang="en-US" dirty="0"/>
           </a:p>
@@ -7310,7 +7321,7 @@
           <a:p>
             <a:fld id="{48A87A34-81AB-432B-8DAE-1953F412C126}" type="datetimeFigureOut">
               <a:rPr lang="en-US" dirty="0"/>
-              <a:t>4/18/2018</a:t>
+              <a:t>5/12/2018</a:t>
             </a:fld>
             <a:endParaRPr lang="en-US" dirty="0"/>
           </a:p>
@@ -7555,7 +7566,7 @@
           <a:p>
             <a:fld id="{48A87A34-81AB-432B-8DAE-1953F412C126}" type="datetimeFigureOut">
               <a:rPr lang="en-US" dirty="0"/>
-              <a:t>4/18/2018</a:t>
+              <a:t>5/12/2018</a:t>
             </a:fld>
             <a:endParaRPr lang="en-US" dirty="0"/>
           </a:p>
@@ -7782,7 +7793,7 @@
           <a:p>
             <a:fld id="{48A87A34-81AB-432B-8DAE-1953F412C126}" type="datetimeFigureOut">
               <a:rPr lang="en-US" dirty="0"/>
-              <a:t>4/18/2018</a:t>
+              <a:t>5/12/2018</a:t>
             </a:fld>
             <a:endParaRPr lang="en-US" dirty="0"/>
           </a:p>
@@ -8158,7 +8169,7 @@
           <a:p>
             <a:fld id="{48A87A34-81AB-432B-8DAE-1953F412C126}" type="datetimeFigureOut">
               <a:rPr lang="en-US" dirty="0"/>
-              <a:t>4/18/2018</a:t>
+              <a:t>5/12/2018</a:t>
             </a:fld>
             <a:endParaRPr lang="en-US" dirty="0"/>
           </a:p>
@@ -8271,7 +8282,7 @@
           <a:p>
             <a:fld id="{48A87A34-81AB-432B-8DAE-1953F412C126}" type="datetimeFigureOut">
               <a:rPr lang="en-US" dirty="0"/>
-              <a:t>4/18/2018</a:t>
+              <a:t>5/12/2018</a:t>
             </a:fld>
             <a:endParaRPr lang="en-US" dirty="0"/>
           </a:p>
@@ -8361,7 +8372,7 @@
           <a:p>
             <a:fld id="{48A87A34-81AB-432B-8DAE-1953F412C126}" type="datetimeFigureOut">
               <a:rPr lang="en-US" dirty="0"/>
-              <a:t>4/18/2018</a:t>
+              <a:t>5/12/2018</a:t>
             </a:fld>
             <a:endParaRPr lang="en-US" dirty="0"/>
           </a:p>
@@ -8605,7 +8616,7 @@
           <a:p>
             <a:fld id="{48A87A34-81AB-432B-8DAE-1953F412C126}" type="datetimeFigureOut">
               <a:rPr lang="en-US" dirty="0"/>
-              <a:t>4/18/2018</a:t>
+              <a:t>5/12/2018</a:t>
             </a:fld>
             <a:endParaRPr lang="en-US" dirty="0"/>
           </a:p>
@@ -8880,7 +8891,7 @@
           <a:p>
             <a:fld id="{48A87A34-81AB-432B-8DAE-1953F412C126}" type="datetimeFigureOut">
               <a:rPr lang="en-US" dirty="0"/>
-              <a:t>4/18/2018</a:t>
+              <a:t>5/12/2018</a:t>
             </a:fld>
             <a:endParaRPr lang="en-US" dirty="0"/>
           </a:p>
@@ -11953,7 +11964,7 @@
             <a:fld id="{48A87A34-81AB-432B-8DAE-1953F412C126}" type="datetimeFigureOut">
               <a:rPr lang="en-US" dirty="0"/>
               <a:pPr/>
-              <a:t>4/18/2018</a:t>
+              <a:t>5/12/2018</a:t>
             </a:fld>
             <a:endParaRPr lang="en-US" dirty="0"/>
           </a:p>
@@ -12374,7 +12385,7 @@
           <p:cNvPr id="2" name="Заголовок 1">
             <a:extLst>
               <a:ext uri="{FF2B5EF4-FFF2-40B4-BE49-F238E27FC236}">
-                <a16:creationId xmlns:a16="http://schemas.microsoft.com/office/drawing/2014/main" xmlns="" id="{12AC2B98-382D-47CD-AADF-9C71664C4770}"/>
+                <a16:creationId xmlns:a16="http://schemas.microsoft.com/office/drawing/2014/main" id="{12AC2B98-382D-47CD-AADF-9C71664C4770}"/>
               </a:ext>
             </a:extLst>
           </p:cNvPr>
@@ -12401,7 +12412,23 @@
             </a:r>
             <a:r>
               <a:rPr lang="en-US" dirty="0"/>
-              <a:t>BotEnglishTeacher</a:t>
+              <a:t>Bot</a:t>
+            </a:r>
+            <a:r>
+              <a:rPr lang="ru-RU" dirty="0"/>
+              <a:t>-</a:t>
+            </a:r>
+            <a:r>
+              <a:rPr lang="en-US" dirty="0"/>
+              <a:t>English</a:t>
+            </a:r>
+            <a:r>
+              <a:rPr lang="ru-RU" dirty="0"/>
+              <a:t>-</a:t>
+            </a:r>
+            <a:r>
+              <a:rPr lang="en-US" dirty="0"/>
+              <a:t>Teacher</a:t>
             </a:r>
             <a:r>
               <a:rPr lang="ru-RU" dirty="0"/>
@@ -12415,7 +12442,7 @@
           <p:cNvPr id="3" name="Подзаголовок 2">
             <a:extLst>
               <a:ext uri="{FF2B5EF4-FFF2-40B4-BE49-F238E27FC236}">
-                <a16:creationId xmlns:a16="http://schemas.microsoft.com/office/drawing/2014/main" xmlns="" id="{C7D3FEA7-DC8B-4802-B16B-97DD7D6952B2}"/>
+                <a16:creationId xmlns:a16="http://schemas.microsoft.com/office/drawing/2014/main" id="{C7D3FEA7-DC8B-4802-B16B-97DD7D6952B2}"/>
               </a:ext>
             </a:extLst>
           </p:cNvPr>
@@ -12473,7 +12500,7 @@
           <p:cNvPr id="2" name="Заголовок 1">
             <a:extLst>
               <a:ext uri="{FF2B5EF4-FFF2-40B4-BE49-F238E27FC236}">
-                <a16:creationId xmlns:a16="http://schemas.microsoft.com/office/drawing/2014/main" xmlns="" id="{5E3D6C65-2E8A-43ED-B8C6-39A133CD1DE5}"/>
+                <a16:creationId xmlns:a16="http://schemas.microsoft.com/office/drawing/2014/main" id="{5E3D6C65-2E8A-43ED-B8C6-39A133CD1DE5}"/>
               </a:ext>
             </a:extLst>
           </p:cNvPr>
@@ -12484,7 +12511,12 @@
             <p:ph type="title"/>
           </p:nvPr>
         </p:nvSpPr>
-        <p:spPr/>
+        <p:spPr>
+          <a:xfrm>
+            <a:off x="1141414" y="392016"/>
+            <a:ext cx="9905998" cy="1478570"/>
+          </a:xfrm>
+        </p:spPr>
         <p:txBody>
           <a:bodyPr/>
           <a:lstStyle/>
@@ -12502,7 +12534,7 @@
           <p:cNvPr id="3" name="Объект 2">
             <a:extLst>
               <a:ext uri="{FF2B5EF4-FFF2-40B4-BE49-F238E27FC236}">
-                <a16:creationId xmlns:a16="http://schemas.microsoft.com/office/drawing/2014/main" xmlns="" id="{D3F85625-3A86-4ADE-A1AF-A1D7FA11B9FA}"/>
+                <a16:creationId xmlns:a16="http://schemas.microsoft.com/office/drawing/2014/main" id="{D3F85625-3A86-4ADE-A1AF-A1D7FA11B9FA}"/>
               </a:ext>
             </a:extLst>
           </p:cNvPr>
@@ -12515,8 +12547,8 @@
         </p:nvSpPr>
         <p:spPr>
           <a:xfrm>
-            <a:off x="1141413" y="1768223"/>
-            <a:ext cx="9905999" cy="4632577"/>
+            <a:off x="1141414" y="1441052"/>
+            <a:ext cx="9905999" cy="4817135"/>
           </a:xfrm>
         </p:spPr>
         <p:txBody>
@@ -12578,23 +12610,14 @@
           </a:p>
           <a:p>
             <a:r>
-              <a:rPr lang="en-US" dirty="0" smtClean="0"/>
+              <a:rPr lang="en-US" dirty="0"/>
               <a:t>Telegram bot API</a:t>
             </a:r>
-            <a:endParaRPr lang="en-US" dirty="0" smtClean="0"/>
-          </a:p>
-          <a:p>
-            <a:r>
-              <a:rPr lang="en-US" dirty="0" err="1" smtClean="0"/>
-              <a:t>Yandex</a:t>
-            </a:r>
-            <a:r>
-              <a:rPr lang="en-US" dirty="0" smtClean="0"/>
-              <a:t> </a:t>
-            </a:r>
+          </a:p>
+          <a:p>
             <a:r>
               <a:rPr lang="en-US" dirty="0"/>
-              <a:t>Translate API</a:t>
+              <a:t>Yandex Translate API</a:t>
             </a:r>
           </a:p>
           <a:p>
@@ -12606,14 +12629,22 @@
           <a:p>
             <a:r>
               <a:rPr lang="en-US" dirty="0"/>
+              <a:t>Oxford Dictionary API</a:t>
+            </a:r>
+            <a:endParaRPr lang="ru-RU" dirty="0"/>
+          </a:p>
+          <a:p>
+            <a:r>
+              <a:rPr lang="en-US" dirty="0"/>
               <a:t>Yandex Disc API</a:t>
             </a:r>
-          </a:p>
-          <a:p>
-            <a:r>
-              <a:rPr lang="en-US" dirty="0"/>
-              <a:t>Oxford Dictionary API</a:t>
-            </a:r>
+            <a:r>
+              <a:rPr lang="ru-RU" dirty="0"/>
+              <a:t> (как было сказано, больше не используется)</a:t>
+            </a:r>
+            <a:endParaRPr lang="en-US" dirty="0"/>
+          </a:p>
+          <a:p>
             <a:endParaRPr lang="ru-RU" dirty="0"/>
           </a:p>
         </p:txBody>
@@ -12653,7 +12684,7 @@
           <p:cNvPr id="2" name="Заголовок 1">
             <a:extLst>
               <a:ext uri="{FF2B5EF4-FFF2-40B4-BE49-F238E27FC236}">
-                <a16:creationId xmlns:a16="http://schemas.microsoft.com/office/drawing/2014/main" xmlns="" id="{0D193473-6F9C-4468-B18C-83738A46AD4F}"/>
+                <a16:creationId xmlns:a16="http://schemas.microsoft.com/office/drawing/2014/main" id="{0D193473-6F9C-4468-B18C-83738A46AD4F}"/>
               </a:ext>
             </a:extLst>
           </p:cNvPr>
@@ -12681,7 +12712,7 @@
           <p:cNvPr id="3" name="Объект 2">
             <a:extLst>
               <a:ext uri="{FF2B5EF4-FFF2-40B4-BE49-F238E27FC236}">
-                <a16:creationId xmlns:a16="http://schemas.microsoft.com/office/drawing/2014/main" xmlns="" id="{25E1CE36-583C-46E3-B4F7-9309C81790EA}"/>
+                <a16:creationId xmlns:a16="http://schemas.microsoft.com/office/drawing/2014/main" id="{25E1CE36-583C-46E3-B4F7-9309C81790EA}"/>
               </a:ext>
             </a:extLst>
           </p:cNvPr>
@@ -12700,7 +12731,7 @@
         </p:spPr>
         <p:txBody>
           <a:bodyPr>
-            <a:normAutofit lnSpcReduction="10000"/>
+            <a:normAutofit/>
           </a:bodyPr>
           <a:lstStyle/>
           <a:p>
@@ -12753,24 +12784,6 @@
             <a:r>
               <a:rPr lang="en-US" dirty="0"/>
               <a:t>Yandex SpeechKit.</a:t>
-            </a:r>
-          </a:p>
-          <a:p>
-            <a:r>
-              <a:rPr lang="en-US" dirty="0"/>
-              <a:t>upload_file, get_file, delete, get_files_list – </a:t>
-            </a:r>
-            <a:r>
-              <a:rPr lang="ru-RU" dirty="0"/>
-              <a:t>работа с </a:t>
-            </a:r>
-            <a:r>
-              <a:rPr lang="en-US" dirty="0"/>
-              <a:t>Yandex Disc</a:t>
-            </a:r>
-            <a:r>
-              <a:rPr lang="ru-RU" dirty="0"/>
-              <a:t>, скачивание и выкладывание файла с базой данных.</a:t>
             </a:r>
           </a:p>
           <a:p>
@@ -12824,7 +12837,7 @@
           <p:cNvPr id="2" name="Заголовок 1">
             <a:extLst>
               <a:ext uri="{FF2B5EF4-FFF2-40B4-BE49-F238E27FC236}">
-                <a16:creationId xmlns:a16="http://schemas.microsoft.com/office/drawing/2014/main" xmlns="" id="{FDBA4D13-CF63-4489-9B12-1596F62307FA}"/>
+                <a16:creationId xmlns:a16="http://schemas.microsoft.com/office/drawing/2014/main" id="{FDBA4D13-CF63-4489-9B12-1596F62307FA}"/>
               </a:ext>
             </a:extLst>
           </p:cNvPr>
@@ -12853,7 +12866,7 @@
           <p:cNvPr id="3" name="Объект 2">
             <a:extLst>
               <a:ext uri="{FF2B5EF4-FFF2-40B4-BE49-F238E27FC236}">
-                <a16:creationId xmlns:a16="http://schemas.microsoft.com/office/drawing/2014/main" xmlns="" id="{CEE0B7B9-86C9-45D4-9D5B-F0DD3558B897}"/>
+                <a16:creationId xmlns:a16="http://schemas.microsoft.com/office/drawing/2014/main" id="{CEE0B7B9-86C9-45D4-9D5B-F0DD3558B897}"/>
               </a:ext>
             </a:extLst>
           </p:cNvPr>
@@ -12866,7 +12879,7 @@
         </p:nvSpPr>
         <p:spPr>
           <a:xfrm>
-            <a:off x="1141412" y="1864476"/>
+            <a:off x="1141413" y="1696696"/>
             <a:ext cx="9905999" cy="4792998"/>
           </a:xfrm>
         </p:spPr>
@@ -12885,11 +12898,19 @@
             </a:r>
             <a:r>
               <a:rPr lang="en-US" dirty="0"/>
-              <a:t>sqlite3 </a:t>
+              <a:t>psycopg2 </a:t>
             </a:r>
             <a:r>
               <a:rPr lang="ru-RU" dirty="0"/>
-              <a:t>как наиболее удобная и простая в освоении. Для базы данных был спроектирован класс </a:t>
+              <a:t>для управления </a:t>
+            </a:r>
+            <a:r>
+              <a:rPr lang="en-US" dirty="0"/>
+              <a:t>postgresql</a:t>
+            </a:r>
+            <a:r>
+              <a:rPr lang="ru-RU" dirty="0"/>
+              <a:t>. Для базы данных был спроектирован класс </a:t>
             </a:r>
             <a:r>
               <a:rPr lang="en-US" dirty="0"/>
@@ -12908,6 +12929,17 @@
             <a:r>
               <a:rPr lang="ru-RU" dirty="0"/>
               <a:t>создание таблицы, которая хранит словарь пользователя.</a:t>
+            </a:r>
+            <a:endParaRPr lang="en-US" dirty="0"/>
+          </a:p>
+          <a:p>
+            <a:r>
+              <a:rPr lang="en-US" dirty="0"/>
+              <a:t>select_users – </a:t>
+            </a:r>
+            <a:r>
+              <a:rPr lang="ru-RU" dirty="0"/>
+              <a:t>выбрать названия всех таблиц.</a:t>
             </a:r>
           </a:p>
           <a:p>
@@ -12985,7 +13017,7 @@
           <p:cNvPr id="3" name="Объект 2">
             <a:extLst>
               <a:ext uri="{FF2B5EF4-FFF2-40B4-BE49-F238E27FC236}">
-                <a16:creationId xmlns:a16="http://schemas.microsoft.com/office/drawing/2014/main" xmlns="" id="{05796F22-30AA-4F1C-BFD4-629B5AE599C2}"/>
+                <a16:creationId xmlns:a16="http://schemas.microsoft.com/office/drawing/2014/main" id="{05796F22-30AA-4F1C-BFD4-629B5AE599C2}"/>
               </a:ext>
             </a:extLst>
           </p:cNvPr>
@@ -13082,7 +13114,7 @@
           <p:cNvPr id="2" name="Заголовок 1">
             <a:extLst>
               <a:ext uri="{FF2B5EF4-FFF2-40B4-BE49-F238E27FC236}">
-                <a16:creationId xmlns:a16="http://schemas.microsoft.com/office/drawing/2014/main" xmlns="" id="{19A703F8-C9FD-4B89-A2E3-51D3A15ABBC2}"/>
+                <a16:creationId xmlns:a16="http://schemas.microsoft.com/office/drawing/2014/main" id="{19A703F8-C9FD-4B89-A2E3-51D3A15ABBC2}"/>
               </a:ext>
             </a:extLst>
           </p:cNvPr>
@@ -13110,7 +13142,7 @@
           <p:cNvPr id="3" name="Объект 2">
             <a:extLst>
               <a:ext uri="{FF2B5EF4-FFF2-40B4-BE49-F238E27FC236}">
-                <a16:creationId xmlns:a16="http://schemas.microsoft.com/office/drawing/2014/main" xmlns="" id="{5083051C-6B84-440A-BA8B-6A13C30372A4}"/>
+                <a16:creationId xmlns:a16="http://schemas.microsoft.com/office/drawing/2014/main" id="{5083051C-6B84-440A-BA8B-6A13C30372A4}"/>
               </a:ext>
             </a:extLst>
           </p:cNvPr>
@@ -13123,12 +13155,14 @@
         </p:nvSpPr>
         <p:spPr>
           <a:xfrm>
-            <a:off x="1141412" y="1848435"/>
-            <a:ext cx="9905999" cy="3541714"/>
+            <a:off x="1141412" y="1848434"/>
+            <a:ext cx="9905999" cy="4007081"/>
           </a:xfrm>
         </p:spPr>
         <p:txBody>
-          <a:bodyPr/>
+          <a:bodyPr>
+            <a:normAutofit fontScale="92500" lnSpcReduction="10000"/>
+          </a:bodyPr>
           <a:lstStyle/>
           <a:p>
             <a:pPr marL="0" indent="0">
@@ -13178,6 +13212,16 @@
           <a:p>
             <a:r>
               <a:rPr lang="en-US" dirty="0"/>
+              <a:t>/add </a:t>
+            </a:r>
+            <a:r>
+              <a:rPr lang="ru-RU" dirty="0"/>
+              <a:t>%слово – перевод% - принимает пару «слово-перевод» и добавляет в словарь.</a:t>
+            </a:r>
+          </a:p>
+          <a:p>
+            <a:r>
+              <a:rPr lang="en-US" dirty="0"/>
               <a:t>/delete %</a:t>
             </a:r>
             <a:r>
@@ -13206,15 +13250,7 @@
           <a:p>
             <a:r>
               <a:rPr lang="en-US" dirty="0"/>
-              <a:t>/</a:t>
-            </a:r>
-            <a:r>
-              <a:rPr lang="en-US" dirty="0" err="1"/>
-              <a:t>train_list</a:t>
-            </a:r>
-            <a:r>
-              <a:rPr lang="en-US" dirty="0"/>
-              <a:t> – </a:t>
+              <a:t>/train_list – </a:t>
             </a:r>
             <a:r>
               <a:rPr lang="ru-RU" dirty="0"/>
@@ -13258,7 +13294,7 @@
           <p:cNvPr id="2" name="Заголовок 1">
             <a:extLst>
               <a:ext uri="{FF2B5EF4-FFF2-40B4-BE49-F238E27FC236}">
-                <a16:creationId xmlns:a16="http://schemas.microsoft.com/office/drawing/2014/main" xmlns="" id="{2B28DE6C-537A-4EA6-974E-11025E453186}"/>
+                <a16:creationId xmlns:a16="http://schemas.microsoft.com/office/drawing/2014/main" id="{2B28DE6C-537A-4EA6-974E-11025E453186}"/>
               </a:ext>
             </a:extLst>
           </p:cNvPr>
@@ -13293,7 +13329,7 @@
           <p:cNvPr id="5" name="Объект 4">
             <a:extLst>
               <a:ext uri="{FF2B5EF4-FFF2-40B4-BE49-F238E27FC236}">
-                <a16:creationId xmlns:a16="http://schemas.microsoft.com/office/drawing/2014/main" xmlns="" id="{CFD343CF-2CEC-4712-8C17-2454FC780456}"/>
+                <a16:creationId xmlns:a16="http://schemas.microsoft.com/office/drawing/2014/main" id="{CFD343CF-2CEC-4712-8C17-2454FC780456}"/>
               </a:ext>
             </a:extLst>
           </p:cNvPr>
@@ -13322,7 +13358,7 @@
           <p:cNvPr id="7" name="Рисунок 6">
             <a:extLst>
               <a:ext uri="{FF2B5EF4-FFF2-40B4-BE49-F238E27FC236}">
-                <a16:creationId xmlns:a16="http://schemas.microsoft.com/office/drawing/2014/main" xmlns="" id="{80957800-E436-4B1D-93BB-97E989A96018}"/>
+                <a16:creationId xmlns:a16="http://schemas.microsoft.com/office/drawing/2014/main" id="{80957800-E436-4B1D-93BB-97E989A96018}"/>
               </a:ext>
             </a:extLst>
           </p:cNvPr>
@@ -13382,7 +13418,7 @@
           <p:cNvPr id="3" name="Рисунок 2">
             <a:extLst>
               <a:ext uri="{FF2B5EF4-FFF2-40B4-BE49-F238E27FC236}">
-                <a16:creationId xmlns:a16="http://schemas.microsoft.com/office/drawing/2014/main" xmlns="" id="{7DA177CD-0F7F-4ED6-8D6C-6E43C685160F}"/>
+                <a16:creationId xmlns:a16="http://schemas.microsoft.com/office/drawing/2014/main" id="{7DA177CD-0F7F-4ED6-8D6C-6E43C685160F}"/>
               </a:ext>
             </a:extLst>
           </p:cNvPr>
@@ -13412,7 +13448,7 @@
           <p:cNvPr id="5" name="Рисунок 4">
             <a:extLst>
               <a:ext uri="{FF2B5EF4-FFF2-40B4-BE49-F238E27FC236}">
-                <a16:creationId xmlns:a16="http://schemas.microsoft.com/office/drawing/2014/main" xmlns="" id="{9B0D6A60-06E4-4E43-89D7-C1B4DCC54584}"/>
+                <a16:creationId xmlns:a16="http://schemas.microsoft.com/office/drawing/2014/main" id="{9B0D6A60-06E4-4E43-89D7-C1B4DCC54584}"/>
               </a:ext>
             </a:extLst>
           </p:cNvPr>
@@ -13472,7 +13508,7 @@
           <p:cNvPr id="3" name="Рисунок 2">
             <a:extLst>
               <a:ext uri="{FF2B5EF4-FFF2-40B4-BE49-F238E27FC236}">
-                <a16:creationId xmlns:a16="http://schemas.microsoft.com/office/drawing/2014/main" xmlns="" id="{A2D8CD7D-4809-4531-9542-4D4278F67B26}"/>
+                <a16:creationId xmlns:a16="http://schemas.microsoft.com/office/drawing/2014/main" id="{A2D8CD7D-4809-4531-9542-4D4278F67B26}"/>
               </a:ext>
             </a:extLst>
           </p:cNvPr>
@@ -13502,7 +13538,7 @@
           <p:cNvPr id="5" name="Рисунок 4">
             <a:extLst>
               <a:ext uri="{FF2B5EF4-FFF2-40B4-BE49-F238E27FC236}">
-                <a16:creationId xmlns:a16="http://schemas.microsoft.com/office/drawing/2014/main" xmlns="" id="{6ACF49F4-B9A9-401A-B744-63E3151A24E5}"/>
+                <a16:creationId xmlns:a16="http://schemas.microsoft.com/office/drawing/2014/main" id="{6ACF49F4-B9A9-401A-B744-63E3151A24E5}"/>
               </a:ext>
             </a:extLst>
           </p:cNvPr>
@@ -13578,10 +13614,9 @@
           <a:lstStyle/>
           <a:p>
             <a:r>
-              <a:rPr lang="ru-RU" dirty="0" smtClean="0"/>
+              <a:rPr lang="ru-RU" dirty="0"/>
               <a:t>Заключение</a:t>
             </a:r>
-            <a:endParaRPr lang="ru-RU" dirty="0"/>
           </a:p>
         </p:txBody>
       </p:sp>
@@ -13597,8 +13632,8 @@
         </p:nvSpPr>
         <p:spPr>
           <a:xfrm>
-            <a:off x="1141410" y="1695939"/>
-            <a:ext cx="9904459" cy="4095260"/>
+            <a:off x="1141410" y="1568741"/>
+            <a:ext cx="9904459" cy="4387442"/>
           </a:xfrm>
         </p:spPr>
         <p:txBody>
@@ -13606,22 +13641,13 @@
           <a:lstStyle/>
           <a:p>
             <a:r>
-              <a:rPr lang="ru-RU" dirty="0" smtClean="0"/>
-              <a:t>В результате проделанной работы была достигнута цель, а </a:t>
-            </a:r>
-            <a:r>
-              <a:rPr lang="ru-RU" smtClean="0"/>
-              <a:t>имено</a:t>
-            </a:r>
-            <a:r>
-              <a:rPr lang="ru-RU" dirty="0" smtClean="0"/>
-              <a:t> был создан телеграмм-бот, который выполняет функцию учителя английского языка. Он позволяет любому пользователю узнать перевод интересующих его слов, их правильное произношение, записать их в свой личный словарь и пройти тренировки по их запоминанию. </a:t>
-            </a:r>
-            <a:endParaRPr lang="ru-RU" dirty="0"/>
-          </a:p>
-          <a:p>
-            <a:r>
-              <a:rPr lang="ru-RU" dirty="0" smtClean="0"/>
+              <a:rPr lang="ru-RU" dirty="0"/>
+              <a:t>В результате проделанной работы была достигнута цель, а именно был создан телеграмм-бот, который выполняет функцию учителя английского языка. Он позволяет любому пользователю узнать перевод интересующих его слов, их правильное произношение, записать их в свой личный словарь и пройти тренировки по их запоминанию. </a:t>
+            </a:r>
+          </a:p>
+          <a:p>
+            <a:r>
+              <a:rPr lang="ru-RU" dirty="0"/>
               <a:t>К созданной программе можно произвести следующие доработки: </a:t>
             </a:r>
           </a:p>
@@ -13631,7 +13657,7 @@
               <a:buChar char="•"/>
             </a:pPr>
             <a:r>
-              <a:rPr lang="ru-RU" dirty="0" smtClean="0"/>
+              <a:rPr lang="ru-RU" dirty="0"/>
               <a:t>расширить список изучаемых языков</a:t>
             </a:r>
           </a:p>
@@ -13641,8 +13667,8 @@
               <a:buChar char="•"/>
             </a:pPr>
             <a:r>
-              <a:rPr lang="ru-RU" dirty="0" smtClean="0"/>
-              <a:t>добавить и усовершенствовать тренировки</a:t>
+              <a:rPr lang="ru-RU" dirty="0"/>
+              <a:t>добавить теоретический блок с грамматическими правилами</a:t>
             </a:r>
           </a:p>
           <a:p>
@@ -13651,10 +13677,34 @@
               <a:buChar char="•"/>
             </a:pPr>
             <a:r>
-              <a:rPr lang="ru-RU" dirty="0" smtClean="0"/>
+              <a:rPr lang="ru-RU" dirty="0"/>
+              <a:t>добавить грамматические упражнения (</a:t>
+            </a:r>
+            <a:r>
+              <a:rPr lang="en-US" dirty="0"/>
+              <a:t>word formation, prepositions, phrasal verbs)</a:t>
+            </a:r>
+            <a:endParaRPr lang="ru-RU" dirty="0"/>
+          </a:p>
+          <a:p>
+            <a:pPr marL="285750" indent="-285750">
+              <a:buFont typeface="Arial" panose="020B0604020202020204" pitchFamily="34" charset="0"/>
+              <a:buChar char="•"/>
+            </a:pPr>
+            <a:r>
+              <a:rPr lang="ru-RU" dirty="0"/>
+              <a:t>добавить и усовершенствовать тренировки</a:t>
+            </a:r>
+          </a:p>
+          <a:p>
+            <a:pPr marL="285750" indent="-285750">
+              <a:buFont typeface="Arial" panose="020B0604020202020204" pitchFamily="34" charset="0"/>
+              <a:buChar char="•"/>
+            </a:pPr>
+            <a:r>
+              <a:rPr lang="ru-RU" dirty="0"/>
               <a:t>создать различные соревнования между несколькими пользователями.</a:t>
             </a:r>
-            <a:endParaRPr lang="ru-RU" dirty="0"/>
           </a:p>
         </p:txBody>
       </p:sp>
@@ -13693,7 +13743,7 @@
           <p:cNvPr id="2" name="Заголовок 1">
             <a:extLst>
               <a:ext uri="{FF2B5EF4-FFF2-40B4-BE49-F238E27FC236}">
-                <a16:creationId xmlns:a16="http://schemas.microsoft.com/office/drawing/2014/main" xmlns="" id="{65112786-0451-451E-AE73-8E751E808BFC}"/>
+                <a16:creationId xmlns:a16="http://schemas.microsoft.com/office/drawing/2014/main" id="{65112786-0451-451E-AE73-8E751E808BFC}"/>
               </a:ext>
             </a:extLst>
           </p:cNvPr>
@@ -13721,7 +13771,7 @@
           <p:cNvPr id="3" name="Объект 2">
             <a:extLst>
               <a:ext uri="{FF2B5EF4-FFF2-40B4-BE49-F238E27FC236}">
-                <a16:creationId xmlns:a16="http://schemas.microsoft.com/office/drawing/2014/main" xmlns="" id="{8FCECB1E-1E6B-4A13-9DD9-E6864D3E5294}"/>
+                <a16:creationId xmlns:a16="http://schemas.microsoft.com/office/drawing/2014/main" id="{8FCECB1E-1E6B-4A13-9DD9-E6864D3E5294}"/>
               </a:ext>
             </a:extLst>
           </p:cNvPr>
@@ -13751,15 +13801,7 @@
             </a:pPr>
             <a:r>
               <a:rPr lang="ru-RU" dirty="0"/>
-              <a:t>Цель приложения: создать телеграмм-бота, который позволил бы пользователю переводить всевозможные слова и </a:t>
-            </a:r>
-            <a:r>
-              <a:rPr lang="ru-RU" dirty="0" smtClean="0"/>
-              <a:t>тренироваться в их запоминании; </a:t>
-            </a:r>
-            <a:r>
-              <a:rPr lang="ru-RU" dirty="0"/>
-              <a:t>использовать несколько </a:t>
+              <a:t>Цель приложения: создать телеграмм-бота, который позволил бы пользователю переводить всевозможные слова и тренироваться в их запоминании; использовать несколько </a:t>
             </a:r>
             <a:r>
               <a:rPr lang="en-US" dirty="0"/>
@@ -13807,7 +13849,7 @@
           <p:cNvPr id="4" name="Заголовок 3">
             <a:extLst>
               <a:ext uri="{FF2B5EF4-FFF2-40B4-BE49-F238E27FC236}">
-                <a16:creationId xmlns:a16="http://schemas.microsoft.com/office/drawing/2014/main" xmlns="" id="{843BBF6E-D95D-462F-94C0-584EA6B40237}"/>
+                <a16:creationId xmlns:a16="http://schemas.microsoft.com/office/drawing/2014/main" id="{843BBF6E-D95D-462F-94C0-584EA6B40237}"/>
               </a:ext>
             </a:extLst>
           </p:cNvPr>
@@ -13835,7 +13877,7 @@
           <p:cNvPr id="5" name="Объект 4">
             <a:extLst>
               <a:ext uri="{FF2B5EF4-FFF2-40B4-BE49-F238E27FC236}">
-                <a16:creationId xmlns:a16="http://schemas.microsoft.com/office/drawing/2014/main" xmlns="" id="{E815F3BF-AEBD-409A-918A-FF46A9DEB275}"/>
+                <a16:creationId xmlns:a16="http://schemas.microsoft.com/office/drawing/2014/main" id="{E815F3BF-AEBD-409A-918A-FF46A9DEB275}"/>
               </a:ext>
             </a:extLst>
           </p:cNvPr>
@@ -13846,9 +13888,16 @@
             <p:ph idx="1"/>
           </p:nvPr>
         </p:nvSpPr>
-        <p:spPr/>
+        <p:spPr>
+          <a:xfrm>
+            <a:off x="1141413" y="1929308"/>
+            <a:ext cx="9905999" cy="3824142"/>
+          </a:xfrm>
+        </p:spPr>
         <p:txBody>
-          <a:bodyPr/>
+          <a:bodyPr>
+            <a:normAutofit/>
+          </a:bodyPr>
           <a:lstStyle/>
           <a:p>
             <a:r>
@@ -13882,7 +13931,7 @@
           <a:p>
             <a:r>
               <a:rPr lang="en-US" dirty="0"/>
-              <a:t>database.py – </a:t>
+              <a:t>postgres.py – </a:t>
             </a:r>
             <a:r>
               <a:rPr lang="ru-RU" dirty="0"/>
@@ -13908,6 +13957,30 @@
               <a:rPr lang="ru-RU" dirty="0"/>
               <a:t>файл с некоторым количеством заранее определенных слов. Используется в тренировках.</a:t>
             </a:r>
+            <a:endParaRPr lang="en-US" dirty="0"/>
+          </a:p>
+          <a:p>
+            <a:r>
+              <a:rPr lang="en-US" dirty="0"/>
+              <a:t>Procfile </a:t>
+            </a:r>
+            <a:r>
+              <a:rPr lang="ru-RU" dirty="0"/>
+              <a:t>и </a:t>
+            </a:r>
+            <a:r>
+              <a:rPr lang="en-US" dirty="0"/>
+              <a:t>requirements.txt – </a:t>
+            </a:r>
+            <a:r>
+              <a:rPr lang="ru-RU" dirty="0"/>
+              <a:t>файлы, необходимые для деплоя на </a:t>
+            </a:r>
+            <a:r>
+              <a:rPr lang="en-US" dirty="0"/>
+              <a:t>Heroku.</a:t>
+            </a:r>
+            <a:endParaRPr lang="ru-RU" dirty="0"/>
           </a:p>
         </p:txBody>
       </p:sp>
@@ -13946,7 +14019,7 @@
           <p:cNvPr id="2" name="Заголовок 1">
             <a:extLst>
               <a:ext uri="{FF2B5EF4-FFF2-40B4-BE49-F238E27FC236}">
-                <a16:creationId xmlns:a16="http://schemas.microsoft.com/office/drawing/2014/main" xmlns="" id="{EFDABA50-A82B-42A1-8BD0-2193731CCD9C}"/>
+                <a16:creationId xmlns:a16="http://schemas.microsoft.com/office/drawing/2014/main" id="{EFDABA50-A82B-42A1-8BD0-2193731CCD9C}"/>
               </a:ext>
             </a:extLst>
           </p:cNvPr>
@@ -13974,7 +14047,7 @@
           <p:cNvPr id="3" name="Объект 2">
             <a:extLst>
               <a:ext uri="{FF2B5EF4-FFF2-40B4-BE49-F238E27FC236}">
-                <a16:creationId xmlns:a16="http://schemas.microsoft.com/office/drawing/2014/main" xmlns="" id="{88BF7460-142D-4E82-A78E-04878FA357B7}"/>
+                <a16:creationId xmlns:a16="http://schemas.microsoft.com/office/drawing/2014/main" id="{88BF7460-142D-4E82-A78E-04878FA357B7}"/>
               </a:ext>
             </a:extLst>
           </p:cNvPr>
@@ -13987,7 +14060,7 @@
         </p:nvSpPr>
         <p:spPr>
           <a:xfrm>
-            <a:off x="1141412" y="1768223"/>
+            <a:off x="1141412" y="1684333"/>
             <a:ext cx="9905999" cy="4712788"/>
           </a:xfrm>
         </p:spPr>
@@ -14021,6 +14094,14 @@
             <a:r>
               <a:rPr lang="ru-RU" dirty="0"/>
               <a:t>3). Слова можно просматривать и удалять в любой момент.</a:t>
+            </a:r>
+            <a:r>
+              <a:rPr lang="en-US" dirty="0"/>
+              <a:t> </a:t>
+            </a:r>
+            <a:r>
+              <a:rPr lang="ru-RU" dirty="0"/>
+              <a:t>Также можно добавлять пользовательские пары «слово – перевод».</a:t>
             </a:r>
           </a:p>
           <a:p>
@@ -14075,7 +14156,7 @@
           <p:cNvPr id="2" name="Заголовок 1">
             <a:extLst>
               <a:ext uri="{FF2B5EF4-FFF2-40B4-BE49-F238E27FC236}">
-                <a16:creationId xmlns:a16="http://schemas.microsoft.com/office/drawing/2014/main" xmlns="" id="{4058AF8A-6F6C-4B04-9A87-F95DEEBABCB2}"/>
+                <a16:creationId xmlns:a16="http://schemas.microsoft.com/office/drawing/2014/main" id="{4058AF8A-6F6C-4B04-9A87-F95DEEBABCB2}"/>
               </a:ext>
             </a:extLst>
           </p:cNvPr>
@@ -14103,7 +14184,7 @@
           <p:cNvPr id="3" name="Объект 2">
             <a:extLst>
               <a:ext uri="{FF2B5EF4-FFF2-40B4-BE49-F238E27FC236}">
-                <a16:creationId xmlns:a16="http://schemas.microsoft.com/office/drawing/2014/main" xmlns="" id="{F4C83349-3AC4-4097-A0AA-B70774C8BE16}"/>
+                <a16:creationId xmlns:a16="http://schemas.microsoft.com/office/drawing/2014/main" id="{F4C83349-3AC4-4097-A0AA-B70774C8BE16}"/>
               </a:ext>
             </a:extLst>
           </p:cNvPr>
@@ -14122,7 +14203,7 @@
         </p:spPr>
         <p:txBody>
           <a:bodyPr>
-            <a:normAutofit fontScale="92500" lnSpcReduction="20000"/>
+            <a:normAutofit fontScale="92500" lnSpcReduction="10000"/>
           </a:bodyPr>
           <a:lstStyle/>
           <a:p>
@@ -14204,7 +14285,7 @@
           <p:cNvPr id="2" name="Заголовок 1">
             <a:extLst>
               <a:ext uri="{FF2B5EF4-FFF2-40B4-BE49-F238E27FC236}">
-                <a16:creationId xmlns:a16="http://schemas.microsoft.com/office/drawing/2014/main" xmlns="" id="{D95F4182-470B-47DE-AE50-B37EE574931F}"/>
+                <a16:creationId xmlns:a16="http://schemas.microsoft.com/office/drawing/2014/main" id="{D95F4182-470B-47DE-AE50-B37EE574931F}"/>
               </a:ext>
             </a:extLst>
           </p:cNvPr>
@@ -14215,7 +14296,12 @@
             <p:ph type="title"/>
           </p:nvPr>
         </p:nvSpPr>
-        <p:spPr/>
+        <p:spPr>
+          <a:xfrm>
+            <a:off x="1141412" y="182291"/>
+            <a:ext cx="9905998" cy="1478570"/>
+          </a:xfrm>
+        </p:spPr>
         <p:txBody>
           <a:bodyPr/>
           <a:lstStyle/>
@@ -14233,7 +14319,7 @@
           <p:cNvPr id="3" name="Объект 2">
             <a:extLst>
               <a:ext uri="{FF2B5EF4-FFF2-40B4-BE49-F238E27FC236}">
-                <a16:creationId xmlns:a16="http://schemas.microsoft.com/office/drawing/2014/main" xmlns="" id="{1853C128-2FFB-44D6-B5D9-1BC59962F93F}"/>
+                <a16:creationId xmlns:a16="http://schemas.microsoft.com/office/drawing/2014/main" id="{1853C128-2FFB-44D6-B5D9-1BC59962F93F}"/>
               </a:ext>
             </a:extLst>
           </p:cNvPr>
@@ -14246,8 +14332,8 @@
         </p:nvSpPr>
         <p:spPr>
           <a:xfrm>
-            <a:off x="1141412" y="1944686"/>
-            <a:ext cx="11050588" cy="4913314"/>
+            <a:off x="1141412" y="1291905"/>
+            <a:ext cx="10317949" cy="5494789"/>
           </a:xfrm>
         </p:spPr>
         <p:txBody>
@@ -14273,17 +14359,6 @@
           <a:p>
             <a:r>
               <a:rPr lang="en-US" dirty="0"/>
-              <a:t>threading – </a:t>
-            </a:r>
-            <a:r>
-              <a:rPr lang="ru-RU" dirty="0"/>
-              <a:t>для регулярного сохранения базы данных на Яндекс.Диск.</a:t>
-            </a:r>
-            <a:endParaRPr lang="en-US" dirty="0"/>
-          </a:p>
-          <a:p>
-            <a:r>
-              <a:rPr lang="en-US" dirty="0"/>
               <a:t>logging</a:t>
             </a:r>
             <a:endParaRPr lang="ru-RU" dirty="0"/>
@@ -14305,6 +14380,39 @@
               <a:rPr lang="en-US" dirty="0"/>
               <a:t>os</a:t>
             </a:r>
+            <a:endParaRPr lang="ru-RU" dirty="0"/>
+          </a:p>
+          <a:p>
+            <a:pPr marL="0" indent="0">
+              <a:buNone/>
+            </a:pPr>
+            <a:r>
+              <a:rPr lang="ru-RU" dirty="0"/>
+              <a:t>В ранней версии бота использовался </a:t>
+            </a:r>
+            <a:r>
+              <a:rPr lang="en-US" dirty="0"/>
+              <a:t>threading – </a:t>
+            </a:r>
+            <a:r>
+              <a:rPr lang="ru-RU" dirty="0"/>
+              <a:t>для регулярного сохранения базы данных на Яндекс.Диск. Однако после деплоя на </a:t>
+            </a:r>
+            <a:r>
+              <a:rPr lang="en-US" dirty="0"/>
+              <a:t>Heroku </a:t>
+            </a:r>
+            <a:r>
+              <a:rPr lang="ru-RU" dirty="0"/>
+              <a:t>необходимость в этом отпала.</a:t>
+            </a:r>
+            <a:endParaRPr lang="en-US" dirty="0"/>
+          </a:p>
+          <a:p>
+            <a:pPr marL="0" indent="0">
+              <a:buNone/>
+            </a:pPr>
+            <a:endParaRPr lang="en-US" dirty="0"/>
           </a:p>
           <a:p>
             <a:endParaRPr lang="ru-RU" dirty="0"/>
@@ -14346,7 +14454,7 @@
           <p:cNvPr id="2" name="Заголовок 1">
             <a:extLst>
               <a:ext uri="{FF2B5EF4-FFF2-40B4-BE49-F238E27FC236}">
-                <a16:creationId xmlns:a16="http://schemas.microsoft.com/office/drawing/2014/main" xmlns="" id="{444867D4-7EF8-472D-B7D2-BE9D2512507D}"/>
+                <a16:creationId xmlns:a16="http://schemas.microsoft.com/office/drawing/2014/main" id="{444867D4-7EF8-472D-B7D2-BE9D2512507D}"/>
               </a:ext>
             </a:extLst>
           </p:cNvPr>
@@ -14374,7 +14482,7 @@
           <p:cNvPr id="3" name="Объект 2">
             <a:extLst>
               <a:ext uri="{FF2B5EF4-FFF2-40B4-BE49-F238E27FC236}">
-                <a16:creationId xmlns:a16="http://schemas.microsoft.com/office/drawing/2014/main" xmlns="" id="{16F19E30-9000-4335-8817-8EB9AE58A3D8}"/>
+                <a16:creationId xmlns:a16="http://schemas.microsoft.com/office/drawing/2014/main" id="{16F19E30-9000-4335-8817-8EB9AE58A3D8}"/>
               </a:ext>
             </a:extLst>
           </p:cNvPr>
@@ -14396,16 +14504,6 @@
             <a:normAutofit/>
           </a:bodyPr>
           <a:lstStyle/>
-          <a:p>
-            <a:r>
-              <a:rPr lang="en-US" dirty="0"/>
-              <a:t>save_file – </a:t>
-            </a:r>
-            <a:r>
-              <a:rPr lang="ru-RU" dirty="0"/>
-              <a:t>сохраняет базу данных.</a:t>
-            </a:r>
-          </a:p>
           <a:p>
             <a:r>
               <a:rPr lang="en-US" dirty="0"/>
@@ -14504,7 +14602,7 @@
           <p:cNvPr id="3" name="Объект 2">
             <a:extLst>
               <a:ext uri="{FF2B5EF4-FFF2-40B4-BE49-F238E27FC236}">
-                <a16:creationId xmlns:a16="http://schemas.microsoft.com/office/drawing/2014/main" xmlns="" id="{C9D520CB-F51A-46F2-8C15-992588C31F28}"/>
+                <a16:creationId xmlns:a16="http://schemas.microsoft.com/office/drawing/2014/main" id="{C9D520CB-F51A-46F2-8C15-992588C31F28}"/>
               </a:ext>
             </a:extLst>
           </p:cNvPr>
@@ -14579,6 +14677,26 @@
           <a:p>
             <a:r>
               <a:rPr lang="en-US" dirty="0"/>
+              <a:t>delete_word – </a:t>
+            </a:r>
+            <a:r>
+              <a:rPr lang="ru-RU" dirty="0"/>
+              <a:t>удаление слова из словаря.</a:t>
+            </a:r>
+          </a:p>
+          <a:p>
+            <a:r>
+              <a:rPr lang="en-US" dirty="0"/>
+              <a:t>add_word </a:t>
+            </a:r>
+            <a:r>
+              <a:rPr lang="ru-RU" dirty="0"/>
+              <a:t>– добавление пользовательской пары «слово – перевод».</a:t>
+            </a:r>
+          </a:p>
+          <a:p>
+            <a:r>
+              <a:rPr lang="en-US" dirty="0"/>
               <a:t>word_translation_training – </a:t>
             </a:r>
             <a:r>
@@ -14594,26 +14712,6 @@
             <a:r>
               <a:rPr lang="ru-RU" dirty="0"/>
               <a:t>тренировка «перевод-слово». </a:t>
-            </a:r>
-          </a:p>
-          <a:p>
-            <a:r>
-              <a:rPr lang="en-US" dirty="0"/>
-              <a:t>audio_training – </a:t>
-            </a:r>
-            <a:r>
-              <a:rPr lang="ru-RU" dirty="0"/>
-              <a:t>тренировка «аудирование».</a:t>
-            </a:r>
-          </a:p>
-          <a:p>
-            <a:r>
-              <a:rPr lang="en-US" dirty="0"/>
-              <a:t>construct_word_training – </a:t>
-            </a:r>
-            <a:r>
-              <a:rPr lang="ru-RU" dirty="0"/>
-              <a:t>тренировка «собери слово».</a:t>
             </a:r>
           </a:p>
         </p:txBody>
@@ -14653,7 +14751,7 @@
           <p:cNvPr id="3" name="Объект 2">
             <a:extLst>
               <a:ext uri="{FF2B5EF4-FFF2-40B4-BE49-F238E27FC236}">
-                <a16:creationId xmlns:a16="http://schemas.microsoft.com/office/drawing/2014/main" xmlns="" id="{923DD978-08C3-4650-998B-0D17F028855F}"/>
+                <a16:creationId xmlns:a16="http://schemas.microsoft.com/office/drawing/2014/main" id="{923DD978-08C3-4650-998B-0D17F028855F}"/>
               </a:ext>
             </a:extLst>
           </p:cNvPr>
@@ -14666,13 +14764,35 @@
         </p:nvSpPr>
         <p:spPr>
           <a:xfrm>
-            <a:off x="1093286" y="950077"/>
-            <a:ext cx="9905999" cy="3541714"/>
+            <a:off x="1093286" y="1044081"/>
+            <a:ext cx="9905999" cy="5305444"/>
           </a:xfrm>
         </p:spPr>
         <p:txBody>
-          <a:bodyPr/>
+          <a:bodyPr>
+            <a:normAutofit/>
+          </a:bodyPr>
           <a:lstStyle/>
+          <a:p>
+            <a:r>
+              <a:rPr lang="en-US" dirty="0"/>
+              <a:t>audio_training – </a:t>
+            </a:r>
+            <a:r>
+              <a:rPr lang="ru-RU" dirty="0"/>
+              <a:t>тренировка «аудирование».</a:t>
+            </a:r>
+          </a:p>
+          <a:p>
+            <a:r>
+              <a:rPr lang="en-US" dirty="0"/>
+              <a:t>construct_word_training – </a:t>
+            </a:r>
+            <a:r>
+              <a:rPr lang="ru-RU" dirty="0"/>
+              <a:t>тренировка «собери слово».</a:t>
+            </a:r>
+          </a:p>
           <a:p>
             <a:r>
               <a:rPr lang="en-US" dirty="0"/>
@@ -14983,7 +15103,7 @@
   <a:extraClrSchemeLst/>
   <a:extLst>
     <a:ext uri="{05A4C25C-085E-4340-85A3-A5531E510DB2}">
-      <thm15:themeFamily xmlns:thm15="http://schemas.microsoft.com/office/thememl/2012/main" xmlns="" name="Circuit" id="{0AC2F7E7-15F5-431C-B2A2-456FE929F56C}" vid="{0911B802-464C-4241-8DD9-B60FF88E379F}"/>
+      <thm15:themeFamily xmlns:thm15="http://schemas.microsoft.com/office/thememl/2012/main" name="Circuit" id="{0AC2F7E7-15F5-431C-B2A2-456FE929F56C}" vid="{0911B802-464C-4241-8DD9-B60FF88E379F}"/>
     </a:ext>
   </a:extLst>
 </a:theme>

</xml_diff>